<commit_message>
switch convex and concave
</commit_message>
<xml_diff>
--- a/outputs/Figures/crop_poll_risk_schematic.pptx
+++ b/outputs/Figures/crop_poll_risk_schematic.pptx
@@ -104,6 +104,11 @@
       </a:defRPr>
     </a:lvl9pPr>
   </p:defaultTextStyle>
+  <p:extLst>
+    <p:ext uri="{EFAFB233-063F-42B5-8137-9DF3F51BA10A}">
+      <p15:sldGuideLst xmlns:p15="http://schemas.microsoft.com/office/powerpoint/2012/main"/>
+    </p:ext>
+  </p:extLst>
 </p:presentation>
 </file>
 
@@ -256,7 +261,7 @@
           <a:p>
             <a:fld id="{6A5BD5BA-2903-48F5-8C23-1BC4F2C2F68A}" type="datetimeFigureOut">
               <a:rPr lang="en-GB" smtClean="0"/>
-              <a:t>04/08/2023</a:t>
+              <a:t>09/08/2023</a:t>
             </a:fld>
             <a:endParaRPr lang="en-GB"/>
           </a:p>
@@ -456,7 +461,7 @@
           <a:p>
             <a:fld id="{6A5BD5BA-2903-48F5-8C23-1BC4F2C2F68A}" type="datetimeFigureOut">
               <a:rPr lang="en-GB" smtClean="0"/>
-              <a:t>04/08/2023</a:t>
+              <a:t>09/08/2023</a:t>
             </a:fld>
             <a:endParaRPr lang="en-GB"/>
           </a:p>
@@ -666,7 +671,7 @@
           <a:p>
             <a:fld id="{6A5BD5BA-2903-48F5-8C23-1BC4F2C2F68A}" type="datetimeFigureOut">
               <a:rPr lang="en-GB" smtClean="0"/>
-              <a:t>04/08/2023</a:t>
+              <a:t>09/08/2023</a:t>
             </a:fld>
             <a:endParaRPr lang="en-GB"/>
           </a:p>
@@ -866,7 +871,7 @@
           <a:p>
             <a:fld id="{6A5BD5BA-2903-48F5-8C23-1BC4F2C2F68A}" type="datetimeFigureOut">
               <a:rPr lang="en-GB" smtClean="0"/>
-              <a:t>04/08/2023</a:t>
+              <a:t>09/08/2023</a:t>
             </a:fld>
             <a:endParaRPr lang="en-GB"/>
           </a:p>
@@ -1142,7 +1147,7 @@
           <a:p>
             <a:fld id="{6A5BD5BA-2903-48F5-8C23-1BC4F2C2F68A}" type="datetimeFigureOut">
               <a:rPr lang="en-GB" smtClean="0"/>
-              <a:t>04/08/2023</a:t>
+              <a:t>09/08/2023</a:t>
             </a:fld>
             <a:endParaRPr lang="en-GB"/>
           </a:p>
@@ -1410,7 +1415,7 @@
           <a:p>
             <a:fld id="{6A5BD5BA-2903-48F5-8C23-1BC4F2C2F68A}" type="datetimeFigureOut">
               <a:rPr lang="en-GB" smtClean="0"/>
-              <a:t>04/08/2023</a:t>
+              <a:t>09/08/2023</a:t>
             </a:fld>
             <a:endParaRPr lang="en-GB"/>
           </a:p>
@@ -1825,7 +1830,7 @@
           <a:p>
             <a:fld id="{6A5BD5BA-2903-48F5-8C23-1BC4F2C2F68A}" type="datetimeFigureOut">
               <a:rPr lang="en-GB" smtClean="0"/>
-              <a:t>04/08/2023</a:t>
+              <a:t>09/08/2023</a:t>
             </a:fld>
             <a:endParaRPr lang="en-GB"/>
           </a:p>
@@ -1967,7 +1972,7 @@
           <a:p>
             <a:fld id="{6A5BD5BA-2903-48F5-8C23-1BC4F2C2F68A}" type="datetimeFigureOut">
               <a:rPr lang="en-GB" smtClean="0"/>
-              <a:t>04/08/2023</a:t>
+              <a:t>09/08/2023</a:t>
             </a:fld>
             <a:endParaRPr lang="en-GB"/>
           </a:p>
@@ -2080,7 +2085,7 @@
           <a:p>
             <a:fld id="{6A5BD5BA-2903-48F5-8C23-1BC4F2C2F68A}" type="datetimeFigureOut">
               <a:rPr lang="en-GB" smtClean="0"/>
-              <a:t>04/08/2023</a:t>
+              <a:t>09/08/2023</a:t>
             </a:fld>
             <a:endParaRPr lang="en-GB"/>
           </a:p>
@@ -2393,7 +2398,7 @@
           <a:p>
             <a:fld id="{6A5BD5BA-2903-48F5-8C23-1BC4F2C2F68A}" type="datetimeFigureOut">
               <a:rPr lang="en-GB" smtClean="0"/>
-              <a:t>04/08/2023</a:t>
+              <a:t>09/08/2023</a:t>
             </a:fld>
             <a:endParaRPr lang="en-GB"/>
           </a:p>
@@ -2682,7 +2687,7 @@
           <a:p>
             <a:fld id="{6A5BD5BA-2903-48F5-8C23-1BC4F2C2F68A}" type="datetimeFigureOut">
               <a:rPr lang="en-GB" smtClean="0"/>
-              <a:t>04/08/2023</a:t>
+              <a:t>09/08/2023</a:t>
             </a:fld>
             <a:endParaRPr lang="en-GB"/>
           </a:p>
@@ -2925,7 +2930,7 @@
           <a:p>
             <a:fld id="{6A5BD5BA-2903-48F5-8C23-1BC4F2C2F68A}" type="datetimeFigureOut">
               <a:rPr lang="en-GB" smtClean="0"/>
-              <a:t>04/08/2023</a:t>
+              <a:t>09/08/2023</a:t>
             </a:fld>
             <a:endParaRPr lang="en-GB"/>
           </a:p>
@@ -3526,7 +3531,7 @@
         </p:nvSpPr>
         <p:spPr>
           <a:xfrm rot="16200000">
-            <a:off x="-404362" y="1717905"/>
+            <a:off x="-384484" y="1737783"/>
             <a:ext cx="1930399" cy="646331"/>
           </a:xfrm>
           <a:prstGeom prst="rect">
@@ -3547,7 +3552,7 @@
                 <a:ea typeface="Roboto Bold" panose="02000000000000000000" pitchFamily="2" charset="0"/>
                 <a:cs typeface="Roboto Bold" panose="02000000000000000000" pitchFamily="2" charset="0"/>
               </a:rPr>
-              <a:t>Pollinator abundance (Ab)</a:t>
+              <a:t>Pollinator abundance</a:t>
             </a:r>
             <a:endParaRPr lang="en-GB" b="1" dirty="0">
               <a:latin typeface="Roboto Bold" panose="02000000000000000000" pitchFamily="2" charset="0"/>
@@ -3571,8 +3576,8 @@
         </p:nvSpPr>
         <p:spPr>
           <a:xfrm>
-            <a:off x="848879" y="2981941"/>
-            <a:ext cx="2323072" cy="369332"/>
+            <a:off x="1037720" y="2972002"/>
+            <a:ext cx="1859805" cy="369332"/>
           </a:xfrm>
           <a:prstGeom prst="rect">
             <a:avLst/>
@@ -3591,7 +3596,7 @@
                 <a:ea typeface="Roboto Bold" panose="02000000000000000000" pitchFamily="2" charset="0"/>
                 <a:cs typeface="Roboto Bold" panose="02000000000000000000" pitchFamily="2" charset="0"/>
               </a:rPr>
-              <a:t>Climate change (CC)</a:t>
+              <a:t>Climate change</a:t>
             </a:r>
             <a:endParaRPr lang="en-GB" b="1" dirty="0">
               <a:latin typeface="Roboto Bold" panose="02000000000000000000" pitchFamily="2" charset="0"/>
@@ -3839,8 +3844,8 @@
         </p:nvSpPr>
         <p:spPr>
           <a:xfrm rot="16200000">
-            <a:off x="-236379" y="4523720"/>
-            <a:ext cx="1662080" cy="923330"/>
+            <a:off x="-318576" y="4580023"/>
+            <a:ext cx="1766839" cy="646331"/>
           </a:xfrm>
           <a:prstGeom prst="rect">
             <a:avLst/>
@@ -3860,23 +3865,7 @@
                 <a:ea typeface="Roboto Bold" panose="02000000000000000000" pitchFamily="2" charset="0"/>
                 <a:cs typeface="Roboto Bold" panose="02000000000000000000" pitchFamily="2" charset="0"/>
               </a:rPr>
-              <a:t>Crop production (</a:t>
-            </a:r>
-            <a:r>
-              <a:rPr lang="en-US" b="1" dirty="0" err="1">
-                <a:latin typeface="Roboto Bold" panose="02000000000000000000" pitchFamily="2" charset="0"/>
-                <a:ea typeface="Roboto Bold" panose="02000000000000000000" pitchFamily="2" charset="0"/>
-                <a:cs typeface="Roboto Bold" panose="02000000000000000000" pitchFamily="2" charset="0"/>
-              </a:rPr>
-              <a:t>Pr</a:t>
-            </a:r>
-            <a:r>
-              <a:rPr lang="en-US" b="1" dirty="0">
-                <a:latin typeface="Roboto Bold" panose="02000000000000000000" pitchFamily="2" charset="0"/>
-                <a:ea typeface="Roboto Bold" panose="02000000000000000000" pitchFamily="2" charset="0"/>
-                <a:cs typeface="Roboto Bold" panose="02000000000000000000" pitchFamily="2" charset="0"/>
-              </a:rPr>
-              <a:t>)</a:t>
+              <a:t>Crop production</a:t>
             </a:r>
             <a:endParaRPr lang="en-GB" b="1" dirty="0">
               <a:latin typeface="Roboto Bold" panose="02000000000000000000" pitchFamily="2" charset="0"/>
@@ -3944,7 +3933,7 @@
         </p:nvSpPr>
         <p:spPr>
           <a:xfrm>
-            <a:off x="941521" y="5888279"/>
+            <a:off x="931582" y="5858462"/>
             <a:ext cx="1930399" cy="646331"/>
           </a:xfrm>
           <a:prstGeom prst="rect">
@@ -3965,7 +3954,7 @@
                 <a:ea typeface="Roboto Bold" panose="02000000000000000000" pitchFamily="2" charset="0"/>
                 <a:cs typeface="Roboto Bold" panose="02000000000000000000" pitchFamily="2" charset="0"/>
               </a:rPr>
-              <a:t>Pollinator abundance (Ab)</a:t>
+              <a:t>Pollinator abundance</a:t>
             </a:r>
             <a:endParaRPr lang="en-GB" b="1" dirty="0">
               <a:latin typeface="Roboto Bold" panose="02000000000000000000" pitchFamily="2" charset="0"/>
@@ -4136,7 +4125,7 @@
         </p:nvSpPr>
         <p:spPr>
           <a:xfrm>
-            <a:off x="3206342" y="2528994"/>
+            <a:off x="3375305" y="2558811"/>
             <a:ext cx="2721725" cy="400110"/>
           </a:xfrm>
           <a:prstGeom prst="rect">
@@ -4157,7 +4146,7 @@
                 <a:ea typeface="Roboto Bold" panose="02000000000000000000" pitchFamily="2" charset="0"/>
                 <a:cs typeface="Roboto Bold" panose="02000000000000000000" pitchFamily="2" charset="0"/>
               </a:rPr>
-              <a:t>Climate data (7)</a:t>
+              <a:t>Climate data (46)</a:t>
             </a:r>
             <a:endParaRPr lang="en-GB" sz="2000" b="1" dirty="0">
               <a:latin typeface="Roboto Bold" panose="02000000000000000000" pitchFamily="2" charset="0"/>
@@ -4194,7 +4183,7 @@
         </p:blipFill>
         <p:spPr>
           <a:xfrm>
-            <a:off x="3622195" y="1037433"/>
+            <a:off x="3622195" y="1067250"/>
             <a:ext cx="2305873" cy="1491013"/>
           </a:xfrm>
           <a:prstGeom prst="rect">
@@ -4237,7 +4226,7 @@
                 <a:ea typeface="Roboto Bold" panose="02000000000000000000" pitchFamily="2" charset="0"/>
                 <a:cs typeface="Roboto Bold" panose="02000000000000000000" pitchFamily="2" charset="0"/>
               </a:rPr>
-              <a:t>Crop production (18)</a:t>
+              <a:t>Crop production (47)</a:t>
             </a:r>
             <a:endParaRPr lang="en-GB" sz="2000" b="1" dirty="0">
               <a:latin typeface="Roboto Bold" panose="02000000000000000000" pitchFamily="2" charset="0"/>
@@ -4296,7 +4285,7 @@
         </p:nvSpPr>
         <p:spPr>
           <a:xfrm>
-            <a:off x="1111700" y="357669"/>
+            <a:off x="1111700" y="29679"/>
             <a:ext cx="1718740" cy="646331"/>
           </a:xfrm>
           <a:prstGeom prst="rect">
@@ -4340,7 +4329,7 @@
         </p:nvSpPr>
         <p:spPr>
           <a:xfrm>
-            <a:off x="6841292" y="254458"/>
+            <a:off x="6841292" y="-3959"/>
             <a:ext cx="1487908" cy="646331"/>
           </a:xfrm>
           <a:prstGeom prst="rect">
@@ -4370,53 +4359,6 @@
           </a:p>
         </p:txBody>
       </p:sp>
-      <p:pic>
-        <p:nvPicPr>
-          <p:cNvPr id="4098" name="Picture 2" descr="A map of the data in the PREDICTS database">
-            <a:extLst>
-              <a:ext uri="{FF2B5EF4-FFF2-40B4-BE49-F238E27FC236}">
-                <a16:creationId xmlns:a16="http://schemas.microsoft.com/office/drawing/2014/main" id="{B3F2F080-2D31-18E5-F9B3-232764FCCBF7}"/>
-              </a:ext>
-            </a:extLst>
-          </p:cNvPr>
-          <p:cNvPicPr>
-            <a:picLocks noChangeAspect="1" noChangeArrowheads="1"/>
-          </p:cNvPicPr>
-          <p:nvPr/>
-        </p:nvPicPr>
-        <p:blipFill>
-          <a:blip r:embed="rId3">
-            <a:extLst>
-              <a:ext uri="{28A0092B-C50C-407E-A947-70E740481C1C}">
-                <a14:useLocalDpi xmlns:a14="http://schemas.microsoft.com/office/drawing/2010/main" val="0"/>
-              </a:ext>
-            </a:extLst>
-          </a:blip>
-          <a:srcRect/>
-          <a:stretch>
-            <a:fillRect/>
-          </a:stretch>
-        </p:blipFill>
-        <p:spPr bwMode="auto">
-          <a:xfrm>
-            <a:off x="6285583" y="1354364"/>
-            <a:ext cx="2751559" cy="1151051"/>
-          </a:xfrm>
-          <a:prstGeom prst="rect">
-            <a:avLst/>
-          </a:prstGeom>
-          <a:noFill/>
-          <a:extLst>
-            <a:ext uri="{909E8E84-426E-40DD-AFC4-6F175D3DCCD1}">
-              <a14:hiddenFill xmlns:a14="http://schemas.microsoft.com/office/drawing/2010/main">
-                <a:solidFill>
-                  <a:srgbClr val="FFFFFF"/>
-                </a:solidFill>
-              </a14:hiddenFill>
-            </a:ext>
-          </a:extLst>
-        </p:spPr>
-      </p:pic>
       <p:cxnSp>
         <p:nvCxnSpPr>
           <p:cNvPr id="32" name="Straight Connector 31">
@@ -4426,13 +4368,15 @@
               </a:ext>
             </a:extLst>
           </p:cNvPr>
-          <p:cNvCxnSpPr/>
+          <p:cNvCxnSpPr>
+            <a:cxnSpLocks/>
+          </p:cNvCxnSpPr>
           <p:nvPr/>
         </p:nvCxnSpPr>
         <p:spPr>
           <a:xfrm>
-            <a:off x="3350983" y="502311"/>
-            <a:ext cx="0" cy="6018028"/>
+            <a:off x="3350983" y="824948"/>
+            <a:ext cx="0" cy="5695391"/>
           </a:xfrm>
           <a:prstGeom prst="line">
             <a:avLst/>
@@ -4473,8 +4417,8 @@
         </p:nvSpPr>
         <p:spPr>
           <a:xfrm>
-            <a:off x="5870524" y="2570553"/>
-            <a:ext cx="3605394" cy="400110"/>
+            <a:off x="5963043" y="2570553"/>
+            <a:ext cx="3661960" cy="400110"/>
           </a:xfrm>
           <a:prstGeom prst="rect">
             <a:avLst/>
@@ -4494,7 +4438,7 @@
                 <a:ea typeface="Roboto Bold" panose="02000000000000000000" pitchFamily="2" charset="0"/>
                 <a:cs typeface="Roboto Bold" panose="02000000000000000000" pitchFamily="2" charset="0"/>
               </a:rPr>
-              <a:t>Biodiversity assemblages (2)</a:t>
+              <a:t>Biodiversity assemblages (45)</a:t>
             </a:r>
             <a:endParaRPr lang="en-GB" sz="2000" b="1" dirty="0">
               <a:latin typeface="Roboto Bold" panose="02000000000000000000" pitchFamily="2" charset="0"/>
@@ -4518,7 +4462,7 @@
         </p:nvSpPr>
         <p:spPr>
           <a:xfrm>
-            <a:off x="7364539" y="4383227"/>
+            <a:off x="7404295" y="4263959"/>
             <a:ext cx="481263" cy="469446"/>
           </a:xfrm>
           <a:prstGeom prst="rect">
@@ -4577,7 +4521,7 @@
         </p:nvSpPr>
         <p:spPr>
           <a:xfrm>
-            <a:off x="7721520" y="4745177"/>
+            <a:off x="7761276" y="4625909"/>
             <a:ext cx="481263" cy="469446"/>
           </a:xfrm>
           <a:prstGeom prst="rect">
@@ -4616,7 +4560,7 @@
           <a:p>
             <a:pPr algn="ctr"/>
             <a:r>
-              <a:rPr lang="en-US" sz="1200" b="1" dirty="0">
+              <a:rPr lang="en-US" sz="1150" b="1" dirty="0">
                 <a:solidFill>
                   <a:schemeClr val="tx1"/>
                 </a:solidFill>
@@ -4626,7 +4570,7 @@
               </a:rPr>
               <a:t>0.95</a:t>
             </a:r>
-            <a:endParaRPr lang="en-GB" sz="1200" b="1" dirty="0">
+            <a:endParaRPr lang="en-GB" sz="1150" b="1" dirty="0">
               <a:solidFill>
                 <a:schemeClr val="tx1"/>
               </a:solidFill>
@@ -4652,7 +4596,7 @@
           <p:nvPr/>
         </p:nvPicPr>
         <p:blipFill>
-          <a:blip r:embed="rId4">
+          <a:blip r:embed="rId3">
             <a:extLst>
               <a:ext uri="{28A0092B-C50C-407E-A947-70E740481C1C}">
                 <a14:useLocalDpi xmlns:a14="http://schemas.microsoft.com/office/drawing/2010/main" val="0"/>
@@ -4666,7 +4610,7 @@
         </p:blipFill>
         <p:spPr bwMode="auto">
           <a:xfrm>
-            <a:off x="7455461" y="4534518"/>
+            <a:off x="7495217" y="4415250"/>
             <a:ext cx="299418" cy="166863"/>
           </a:xfrm>
           <a:prstGeom prst="rect">
@@ -4735,7 +4679,7 @@
         </p:nvSpPr>
         <p:spPr>
           <a:xfrm>
-            <a:off x="6330271" y="5341573"/>
+            <a:off x="6598624" y="5222305"/>
             <a:ext cx="2510748" cy="707886"/>
           </a:xfrm>
           <a:prstGeom prst="rect">
@@ -4756,7 +4700,7 @@
                 <a:ea typeface="Roboto Bold" panose="02000000000000000000" pitchFamily="2" charset="0"/>
                 <a:cs typeface="Roboto Bold" panose="02000000000000000000" pitchFamily="2" charset="0"/>
               </a:rPr>
-              <a:t>Pollination dependence (12)</a:t>
+              <a:t>Pollination dependence (36)</a:t>
             </a:r>
             <a:endParaRPr lang="en-GB" sz="2000" b="1" dirty="0">
               <a:latin typeface="Roboto Bold" panose="02000000000000000000" pitchFamily="2" charset="0"/>
@@ -4828,7 +4772,7 @@
         </p:nvSpPr>
         <p:spPr>
           <a:xfrm>
-            <a:off x="9475918" y="5363740"/>
+            <a:off x="9625003" y="5363740"/>
             <a:ext cx="2138175" cy="400110"/>
           </a:xfrm>
           <a:prstGeom prst="rect">
@@ -4849,7 +4793,7 @@
                 <a:ea typeface="Roboto Bold" panose="02000000000000000000" pitchFamily="2" charset="0"/>
                 <a:cs typeface="Roboto Bold" panose="02000000000000000000" pitchFamily="2" charset="0"/>
               </a:rPr>
-              <a:t>Crop price (26)</a:t>
+              <a:t>Crop price (74)</a:t>
             </a:r>
             <a:endParaRPr lang="en-GB" sz="2000" b="1" dirty="0">
               <a:latin typeface="Roboto Bold" panose="02000000000000000000" pitchFamily="2" charset="0"/>
@@ -4874,7 +4818,7 @@
           <p:nvPr/>
         </p:nvPicPr>
         <p:blipFill>
-          <a:blip r:embed="rId5" cstate="print"/>
+          <a:blip r:embed="rId4" cstate="print"/>
           <a:srcRect r="11369"/>
           <a:stretch>
             <a:fillRect/>
@@ -4911,7 +4855,7 @@
         </p:nvSpPr>
         <p:spPr>
           <a:xfrm>
-            <a:off x="9389658" y="2446139"/>
+            <a:off x="9310146" y="2446139"/>
             <a:ext cx="2802342" cy="707886"/>
           </a:xfrm>
           <a:prstGeom prst="rect">
@@ -4932,7 +4876,7 @@
                 <a:ea typeface="Roboto Bold" panose="02000000000000000000" pitchFamily="2" charset="0"/>
                 <a:cs typeface="Roboto Bold" panose="02000000000000000000" pitchFamily="2" charset="0"/>
               </a:rPr>
-              <a:t>Likely animal pollinators (3)</a:t>
+              <a:t>Likely animal pollinators (17)</a:t>
             </a:r>
             <a:endParaRPr lang="en-GB" sz="2000" b="1" dirty="0">
               <a:latin typeface="Roboto Bold" panose="02000000000000000000" pitchFamily="2" charset="0"/>
@@ -4944,10 +4888,10 @@
       </p:sp>
       <p:pic>
         <p:nvPicPr>
-          <p:cNvPr id="24" name="Picture 5">
-            <a:extLst>
-              <a:ext uri="{FF2B5EF4-FFF2-40B4-BE49-F238E27FC236}">
-                <a16:creationId xmlns:a16="http://schemas.microsoft.com/office/drawing/2014/main" id="{ED20B040-BB85-A319-CFEE-366B0188C325}"/>
+          <p:cNvPr id="1026" name="Picture 2">
+            <a:extLst>
+              <a:ext uri="{FF2B5EF4-FFF2-40B4-BE49-F238E27FC236}">
+                <a16:creationId xmlns:a16="http://schemas.microsoft.com/office/drawing/2014/main" id="{8F9F768C-390F-DC6D-9628-350657540327}"/>
               </a:ext>
             </a:extLst>
           </p:cNvPr>
@@ -4957,8 +4901,12 @@
           <p:nvPr/>
         </p:nvPicPr>
         <p:blipFill>
-          <a:blip r:embed="rId6" cstate="print">
-            <a:lum bright="-2000" contrast="21000"/>
+          <a:blip r:embed="rId5">
+            <a:extLst>
+              <a:ext uri="{28A0092B-C50C-407E-A947-70E740481C1C}">
+                <a14:useLocalDpi xmlns:a14="http://schemas.microsoft.com/office/drawing/2010/main" val="0"/>
+              </a:ext>
+            </a:extLst>
           </a:blip>
           <a:srcRect/>
           <a:stretch>
@@ -4967,22 +4915,57 @@
         </p:blipFill>
         <p:spPr bwMode="auto">
           <a:xfrm>
-            <a:off x="10123375" y="1234695"/>
-            <a:ext cx="1334908" cy="1049273"/>
+            <a:off x="10008704" y="1223261"/>
+            <a:ext cx="1380244" cy="1140698"/>
           </a:xfrm>
           <a:prstGeom prst="rect">
             <a:avLst/>
           </a:prstGeom>
           <a:noFill/>
-          <a:ln w="9525">
-            <a:noFill/>
-            <a:miter lim="800000"/>
-            <a:headEnd/>
-            <a:tailEnd/>
-          </a:ln>
-          <a:effectLst>
-            <a:softEdge rad="127000"/>
-          </a:effectLst>
+          <a:extLst>
+            <a:ext uri="{909E8E84-426E-40DD-AFC4-6F175D3DCCD1}">
+              <a14:hiddenFill xmlns:a14="http://schemas.microsoft.com/office/drawing/2010/main">
+                <a:solidFill>
+                  <a:srgbClr val="FFFFFF"/>
+                </a:solidFill>
+              </a14:hiddenFill>
+            </a:ext>
+          </a:extLst>
+        </p:spPr>
+      </p:pic>
+      <p:pic>
+        <p:nvPicPr>
+          <p:cNvPr id="25" name="Picture 24" descr="A map of the world&#10;&#10;Description automatically generated">
+            <a:extLst>
+              <a:ext uri="{FF2B5EF4-FFF2-40B4-BE49-F238E27FC236}">
+                <a16:creationId xmlns:a16="http://schemas.microsoft.com/office/drawing/2014/main" id="{F3516364-16E1-D564-307D-058351B763FF}"/>
+              </a:ext>
+            </a:extLst>
+          </p:cNvPr>
+          <p:cNvPicPr>
+            <a:picLocks noChangeAspect="1"/>
+          </p:cNvPicPr>
+          <p:nvPr/>
+        </p:nvPicPr>
+        <p:blipFill rotWithShape="1">
+          <a:blip r:embed="rId6">
+            <a:extLst>
+              <a:ext uri="{28A0092B-C50C-407E-A947-70E740481C1C}">
+                <a14:useLocalDpi xmlns:a14="http://schemas.microsoft.com/office/drawing/2010/main" val="0"/>
+              </a:ext>
+            </a:extLst>
+          </a:blip>
+          <a:srcRect t="3536" r="50217" b="62239"/>
+          <a:stretch/>
+        </p:blipFill>
+        <p:spPr>
+          <a:xfrm>
+            <a:off x="6102626" y="1086431"/>
+            <a:ext cx="2890407" cy="1492248"/>
+          </a:xfrm>
+          <a:prstGeom prst="rect">
+            <a:avLst/>
+          </a:prstGeom>
         </p:spPr>
       </p:pic>
     </p:spTree>
@@ -5547,7 +5530,7 @@
                                 </p:cTn>
                               </p:par>
                               <p:par>
-                                <p:cTn id="45" presetID="1" presetClass="entr" presetSubtype="0" fill="hold" nodeType="withEffect">
+                                <p:cTn id="45" presetID="1" presetClass="entr" presetSubtype="0" fill="hold" grpId="0" nodeType="withEffect">
                                   <p:stCondLst>
                                     <p:cond delay="0"/>
                                   </p:stCondLst>
@@ -5555,33 +5538,6 @@
                                     <p:set>
                                       <p:cBhvr>
                                         <p:cTn id="46" dur="1" fill="hold">
-                                          <p:stCondLst>
-                                            <p:cond delay="0"/>
-                                          </p:stCondLst>
-                                        </p:cTn>
-                                        <p:tgtEl>
-                                          <p:spTgt spid="4098"/>
-                                        </p:tgtEl>
-                                        <p:attrNameLst>
-                                          <p:attrName>style.visibility</p:attrName>
-                                        </p:attrNameLst>
-                                      </p:cBhvr>
-                                      <p:to>
-                                        <p:strVal val="visible"/>
-                                      </p:to>
-                                    </p:set>
-                                  </p:childTnLst>
-                                </p:cTn>
-                              </p:par>
-                              <p:par>
-                                <p:cTn id="47" presetID="1" presetClass="entr" presetSubtype="0" fill="hold" grpId="0" nodeType="withEffect">
-                                  <p:stCondLst>
-                                    <p:cond delay="0"/>
-                                  </p:stCondLst>
-                                  <p:childTnLst>
-                                    <p:set>
-                                      <p:cBhvr>
-                                        <p:cTn id="48" dur="1" fill="hold">
                                           <p:stCondLst>
                                             <p:cond delay="0"/>
                                           </p:stCondLst>
@@ -5607,26 +5563,26 @@
                     </p:cTn>
                   </p:par>
                   <p:par>
-                    <p:cTn id="49" fill="hold">
+                    <p:cTn id="47" fill="hold">
                       <p:stCondLst>
                         <p:cond delay="indefinite"/>
                       </p:stCondLst>
                       <p:childTnLst>
                         <p:par>
-                          <p:cTn id="50" fill="hold">
+                          <p:cTn id="48" fill="hold">
                             <p:stCondLst>
                               <p:cond delay="0"/>
                             </p:stCondLst>
                             <p:childTnLst>
                               <p:par>
-                                <p:cTn id="51" presetID="1" presetClass="entr" presetSubtype="0" fill="hold" grpId="0" nodeType="clickEffect">
+                                <p:cTn id="49" presetID="1" presetClass="entr" presetSubtype="0" fill="hold" grpId="0" nodeType="clickEffect">
                                   <p:stCondLst>
                                     <p:cond delay="0"/>
                                   </p:stCondLst>
                                   <p:childTnLst>
                                     <p:set>
                                       <p:cBhvr>
-                                        <p:cTn id="52" dur="1" fill="hold">
+                                        <p:cTn id="50" dur="1" fill="hold">
                                           <p:stCondLst>
                                             <p:cond delay="0"/>
                                           </p:stCondLst>
@@ -5646,7 +5602,34 @@
                                 </p:cTn>
                               </p:par>
                               <p:par>
-                                <p:cTn id="53" presetID="1" presetClass="entr" presetSubtype="0" fill="hold" nodeType="withEffect">
+                                <p:cTn id="51" presetID="1" presetClass="entr" presetSubtype="0" fill="hold" nodeType="withEffect">
+                                  <p:stCondLst>
+                                    <p:cond delay="0"/>
+                                  </p:stCondLst>
+                                  <p:childTnLst>
+                                    <p:set>
+                                      <p:cBhvr>
+                                        <p:cTn id="52" dur="1" fill="hold">
+                                          <p:stCondLst>
+                                            <p:cond delay="0"/>
+                                          </p:stCondLst>
+                                        </p:cTn>
+                                        <p:tgtEl>
+                                          <p:spTgt spid="23"/>
+                                        </p:tgtEl>
+                                        <p:attrNameLst>
+                                          <p:attrName>style.visibility</p:attrName>
+                                        </p:attrNameLst>
+                                      </p:cBhvr>
+                                      <p:to>
+                                        <p:strVal val="visible"/>
+                                      </p:to>
+                                    </p:set>
+                                  </p:childTnLst>
+                                </p:cTn>
+                              </p:par>
+                              <p:par>
+                                <p:cTn id="53" presetID="1" presetClass="entr" presetSubtype="0" fill="hold" grpId="0" nodeType="withEffect">
                                   <p:stCondLst>
                                     <p:cond delay="0"/>
                                   </p:stCondLst>
@@ -5659,7 +5642,7 @@
                                           </p:stCondLst>
                                         </p:cTn>
                                         <p:tgtEl>
-                                          <p:spTgt spid="23"/>
+                                          <p:spTgt spid="35"/>
                                         </p:tgtEl>
                                         <p:attrNameLst>
                                           <p:attrName>style.visibility</p:attrName>
@@ -5686,33 +5669,6 @@
                                           </p:stCondLst>
                                         </p:cTn>
                                         <p:tgtEl>
-                                          <p:spTgt spid="35"/>
-                                        </p:tgtEl>
-                                        <p:attrNameLst>
-                                          <p:attrName>style.visibility</p:attrName>
-                                        </p:attrNameLst>
-                                      </p:cBhvr>
-                                      <p:to>
-                                        <p:strVal val="visible"/>
-                                      </p:to>
-                                    </p:set>
-                                  </p:childTnLst>
-                                </p:cTn>
-                              </p:par>
-                              <p:par>
-                                <p:cTn id="57" presetID="1" presetClass="entr" presetSubtype="0" fill="hold" grpId="0" nodeType="withEffect">
-                                  <p:stCondLst>
-                                    <p:cond delay="0"/>
-                                  </p:stCondLst>
-                                  <p:childTnLst>
-                                    <p:set>
-                                      <p:cBhvr>
-                                        <p:cTn id="58" dur="1" fill="hold">
-                                          <p:stCondLst>
-                                            <p:cond delay="0"/>
-                                          </p:stCondLst>
-                                        </p:cTn>
-                                        <p:tgtEl>
                                           <p:spTgt spid="36"/>
                                         </p:tgtEl>
                                         <p:attrNameLst>
@@ -5727,7 +5683,34 @@
                                 </p:cTn>
                               </p:par>
                               <p:par>
-                                <p:cTn id="59" presetID="1" presetClass="entr" presetSubtype="0" fill="hold" nodeType="withEffect">
+                                <p:cTn id="57" presetID="1" presetClass="entr" presetSubtype="0" fill="hold" nodeType="withEffect">
+                                  <p:stCondLst>
+                                    <p:cond delay="0"/>
+                                  </p:stCondLst>
+                                  <p:childTnLst>
+                                    <p:set>
+                                      <p:cBhvr>
+                                        <p:cTn id="58" dur="1" fill="hold">
+                                          <p:stCondLst>
+                                            <p:cond delay="0"/>
+                                          </p:stCondLst>
+                                        </p:cTn>
+                                        <p:tgtEl>
+                                          <p:spTgt spid="38"/>
+                                        </p:tgtEl>
+                                        <p:attrNameLst>
+                                          <p:attrName>style.visibility</p:attrName>
+                                        </p:attrNameLst>
+                                      </p:cBhvr>
+                                      <p:to>
+                                        <p:strVal val="visible"/>
+                                      </p:to>
+                                    </p:set>
+                                  </p:childTnLst>
+                                </p:cTn>
+                              </p:par>
+                              <p:par>
+                                <p:cTn id="59" presetID="1" presetClass="entr" presetSubtype="0" fill="hold" grpId="0" nodeType="withEffect">
                                   <p:stCondLst>
                                     <p:cond delay="0"/>
                                   </p:stCondLst>
@@ -5740,7 +5723,7 @@
                                           </p:stCondLst>
                                         </p:cTn>
                                         <p:tgtEl>
-                                          <p:spTgt spid="38"/>
+                                          <p:spTgt spid="46"/>
                                         </p:tgtEl>
                                         <p:attrNameLst>
                                           <p:attrName>style.visibility</p:attrName>
@@ -5767,33 +5750,6 @@
                                           </p:stCondLst>
                                         </p:cTn>
                                         <p:tgtEl>
-                                          <p:spTgt spid="46"/>
-                                        </p:tgtEl>
-                                        <p:attrNameLst>
-                                          <p:attrName>style.visibility</p:attrName>
-                                        </p:attrNameLst>
-                                      </p:cBhvr>
-                                      <p:to>
-                                        <p:strVal val="visible"/>
-                                      </p:to>
-                                    </p:set>
-                                  </p:childTnLst>
-                                </p:cTn>
-                              </p:par>
-                              <p:par>
-                                <p:cTn id="63" presetID="1" presetClass="entr" presetSubtype="0" fill="hold" grpId="0" nodeType="withEffect">
-                                  <p:stCondLst>
-                                    <p:cond delay="0"/>
-                                  </p:stCondLst>
-                                  <p:childTnLst>
-                                    <p:set>
-                                      <p:cBhvr>
-                                        <p:cTn id="64" dur="1" fill="hold">
-                                          <p:stCondLst>
-                                            <p:cond delay="0"/>
-                                          </p:stCondLst>
-                                        </p:cTn>
-                                        <p:tgtEl>
                                           <p:spTgt spid="57"/>
                                         </p:tgtEl>
                                         <p:attrNameLst>
@@ -5808,14 +5764,14 @@
                                 </p:cTn>
                               </p:par>
                               <p:par>
-                                <p:cTn id="65" presetID="1" presetClass="entr" presetSubtype="0" fill="hold" nodeType="withEffect">
+                                <p:cTn id="63" presetID="1" presetClass="entr" presetSubtype="0" fill="hold" nodeType="withEffect">
                                   <p:stCondLst>
                                     <p:cond delay="0"/>
                                   </p:stCondLst>
                                   <p:childTnLst>
                                     <p:set>
                                       <p:cBhvr>
-                                        <p:cTn id="66" dur="1" fill="hold">
+                                        <p:cTn id="64" dur="1" fill="hold">
                                           <p:stCondLst>
                                             <p:cond delay="0"/>
                                           </p:stCondLst>
@@ -5835,14 +5791,14 @@
                                 </p:cTn>
                               </p:par>
                               <p:par>
-                                <p:cTn id="67" presetID="1" presetClass="entr" presetSubtype="0" fill="hold" grpId="0" nodeType="withEffect">
+                                <p:cTn id="65" presetID="1" presetClass="entr" presetSubtype="0" fill="hold" grpId="0" nodeType="withEffect">
                                   <p:stCondLst>
                                     <p:cond delay="0"/>
                                   </p:stCondLst>
                                   <p:childTnLst>
                                     <p:set>
                                       <p:cBhvr>
-                                        <p:cTn id="68" dur="1" fill="hold">
+                                        <p:cTn id="66" dur="1" fill="hold">
                                           <p:stCondLst>
                                             <p:cond delay="0"/>
                                           </p:stCondLst>
@@ -5858,41 +5814,6 @@
                                         <p:strVal val="visible"/>
                                       </p:to>
                                     </p:set>
-                                  </p:childTnLst>
-                                </p:cTn>
-                              </p:par>
-                              <p:par>
-                                <p:cTn id="69" presetID="10" presetClass="entr" presetSubtype="0" fill="hold" nodeType="withEffect">
-                                  <p:stCondLst>
-                                    <p:cond delay="0"/>
-                                  </p:stCondLst>
-                                  <p:childTnLst>
-                                    <p:set>
-                                      <p:cBhvr>
-                                        <p:cTn id="70" dur="1" fill="hold">
-                                          <p:stCondLst>
-                                            <p:cond delay="0"/>
-                                          </p:stCondLst>
-                                        </p:cTn>
-                                        <p:tgtEl>
-                                          <p:spTgt spid="24"/>
-                                        </p:tgtEl>
-                                        <p:attrNameLst>
-                                          <p:attrName>style.visibility</p:attrName>
-                                        </p:attrNameLst>
-                                      </p:cBhvr>
-                                      <p:to>
-                                        <p:strVal val="visible"/>
-                                      </p:to>
-                                    </p:set>
-                                    <p:animEffect transition="in" filter="fade">
-                                      <p:cBhvr>
-                                        <p:cTn id="71" dur="500"/>
-                                        <p:tgtEl>
-                                          <p:spTgt spid="24"/>
-                                        </p:tgtEl>
-                                      </p:cBhvr>
-                                    </p:animEffect>
                                   </p:childTnLst>
                                 </p:cTn>
                               </p:par>

</xml_diff>